<commit_message>
Adaugare GitHub in Powerpoint
</commit_message>
<xml_diff>
--- a/proiect final - Petre Vladimir.pptx
+++ b/proiect final - Petre Vladimir.pptx
@@ -5,25 +5,25 @@
     <p:sldMasterId id="2147483648" r:id="rId1"/>
   </p:sldMasterIdLst>
   <p:sldIdLst>
-    <p:sldId id="256" r:id="rId2"/>
-    <p:sldId id="257" r:id="rId3"/>
-    <p:sldId id="258" r:id="rId4"/>
-    <p:sldId id="259" r:id="rId5"/>
-    <p:sldId id="260" r:id="rId6"/>
-    <p:sldId id="261" r:id="rId7"/>
-    <p:sldId id="262" r:id="rId8"/>
-    <p:sldId id="263" r:id="rId9"/>
-    <p:sldId id="272" r:id="rId10"/>
-    <p:sldId id="271" r:id="rId11"/>
-    <p:sldId id="264" r:id="rId12"/>
-    <p:sldId id="273" r:id="rId13"/>
-    <p:sldId id="274" r:id="rId14"/>
-    <p:sldId id="265" r:id="rId15"/>
-    <p:sldId id="266" r:id="rId16"/>
-    <p:sldId id="267" r:id="rId17"/>
-    <p:sldId id="268" r:id="rId18"/>
-    <p:sldId id="269" r:id="rId19"/>
-    <p:sldId id="270" r:id="rId20"/>
+    <p:sldId id="256" r:id="rId3"/>
+    <p:sldId id="257" r:id="rId4"/>
+    <p:sldId id="258" r:id="rId5"/>
+    <p:sldId id="259" r:id="rId6"/>
+    <p:sldId id="260" r:id="rId7"/>
+    <p:sldId id="261" r:id="rId8"/>
+    <p:sldId id="262" r:id="rId9"/>
+    <p:sldId id="263" r:id="rId10"/>
+    <p:sldId id="272" r:id="rId11"/>
+    <p:sldId id="271" r:id="rId12"/>
+    <p:sldId id="264" r:id="rId13"/>
+    <p:sldId id="273" r:id="rId14"/>
+    <p:sldId id="274" r:id="rId15"/>
+    <p:sldId id="265" r:id="rId16"/>
+    <p:sldId id="266" r:id="rId17"/>
+    <p:sldId id="267" r:id="rId18"/>
+    <p:sldId id="268" r:id="rId19"/>
+    <p:sldId id="269" r:id="rId20"/>
+    <p:sldId id="270" r:id="rId21"/>
   </p:sldIdLst>
   <p:sldSz cx="9144000" cy="6858000" type="screen4x3"/>
   <p:notesSz cx="6858000" cy="9144000"/>
@@ -232,7 +232,7 @@
 </file>
 
 <file path=ppt/slideLayouts/slideLayout1.xml><?xml version="1.0" encoding="utf-8"?>
-<p:sldLayout xmlns:a="http://schemas.openxmlformats.org/drawingml/2006/main" xmlns:r="http://schemas.openxmlformats.org/officeDocument/2006/relationships" xmlns:p="http://schemas.openxmlformats.org/presentationml/2006/main" showMasterSp="0" type="title" preserve="1">
+<p:sldLayout xmlns:a="http://schemas.openxmlformats.org/drawingml/2006/main" xmlns:r="http://schemas.openxmlformats.org/officeDocument/2006/relationships" xmlns:p="http://schemas.openxmlformats.org/presentationml/2006/main" type="title" preserve="1" showMasterSp="0">
   <p:cSld name="Title Slide">
     <p:bg>
       <p:bgPr>
@@ -313,6 +313,7 @@
               <a:rPr lang="en-US" altLang="zh-CN" noProof="0"/>
               <a:t>Click to edit Master title style</a:t>
             </a:r>
+            <a:endParaRPr lang="en-US" altLang="zh-CN" noProof="0"/>
           </a:p>
         </p:txBody>
       </p:sp>
@@ -347,6 +348,7 @@
               <a:rPr lang="en-US" altLang="zh-CN" noProof="0"/>
               <a:t>Click to edit Master subtitle style</a:t>
             </a:r>
+            <a:endParaRPr lang="en-US" altLang="zh-CN" noProof="0"/>
           </a:p>
         </p:txBody>
       </p:sp>
@@ -531,7 +533,6 @@
             <a:pPr lvl="0"/>
             <a:fld id="{9A0DB2DC-4C9A-4742-B13C-FB6460FD3503}" type="slidenum">
               <a:rPr lang="zh-CN" altLang="en-US" dirty="0"/>
-              <a:t>‹#›</a:t>
             </a:fld>
             <a:endParaRPr lang="zh-CN" altLang="en-US" dirty="0"/>
           </a:p>
@@ -582,6 +583,7 @@
               <a:rPr lang="en-US"/>
               <a:t>Click to edit Master title style</a:t>
             </a:r>
+            <a:endParaRPr lang="en-US"/>
           </a:p>
         </p:txBody>
       </p:sp>
@@ -605,6 +607,7 @@
               <a:rPr lang="en-US"/>
               <a:t>Click to edit Master text styles</a:t>
             </a:r>
+            <a:endParaRPr lang="en-US"/>
           </a:p>
           <a:p>
             <a:pPr lvl="1"/>
@@ -612,6 +615,7 @@
               <a:rPr lang="en-US"/>
               <a:t>Second level</a:t>
             </a:r>
+            <a:endParaRPr lang="en-US"/>
           </a:p>
           <a:p>
             <a:pPr lvl="2"/>
@@ -619,6 +623,7 @@
               <a:rPr lang="en-US"/>
               <a:t>Third level</a:t>
             </a:r>
+            <a:endParaRPr lang="en-US"/>
           </a:p>
           <a:p>
             <a:pPr lvl="3"/>
@@ -626,6 +631,7 @@
               <a:rPr lang="en-US"/>
               <a:t>Fourth level</a:t>
             </a:r>
+            <a:endParaRPr lang="en-US"/>
           </a:p>
           <a:p>
             <a:pPr lvl="4"/>
@@ -633,6 +639,7 @@
               <a:rPr lang="en-US"/>
               <a:t>Fifth level</a:t>
             </a:r>
+            <a:endParaRPr lang="en-US"/>
           </a:p>
         </p:txBody>
       </p:sp>
@@ -694,7 +701,6 @@
             <a:pPr lvl="0"/>
             <a:fld id="{9A0DB2DC-4C9A-4742-B13C-FB6460FD3503}" type="slidenum">
               <a:rPr lang="zh-CN" altLang="en-US" dirty="0"/>
-              <a:t>‹#›</a:t>
             </a:fld>
             <a:endParaRPr lang="zh-CN" altLang="en-US" dirty="0"/>
           </a:p>
@@ -750,6 +756,7 @@
               <a:rPr lang="en-US"/>
               <a:t>Click to edit Master title style</a:t>
             </a:r>
+            <a:endParaRPr lang="en-US"/>
           </a:p>
         </p:txBody>
       </p:sp>
@@ -778,6 +785,7 @@
               <a:rPr lang="en-US"/>
               <a:t>Click to edit Master text styles</a:t>
             </a:r>
+            <a:endParaRPr lang="en-US"/>
           </a:p>
           <a:p>
             <a:pPr lvl="1"/>
@@ -785,6 +793,7 @@
               <a:rPr lang="en-US"/>
               <a:t>Second level</a:t>
             </a:r>
+            <a:endParaRPr lang="en-US"/>
           </a:p>
           <a:p>
             <a:pPr lvl="2"/>
@@ -792,6 +801,7 @@
               <a:rPr lang="en-US"/>
               <a:t>Third level</a:t>
             </a:r>
+            <a:endParaRPr lang="en-US"/>
           </a:p>
           <a:p>
             <a:pPr lvl="3"/>
@@ -799,6 +809,7 @@
               <a:rPr lang="en-US"/>
               <a:t>Fourth level</a:t>
             </a:r>
+            <a:endParaRPr lang="en-US"/>
           </a:p>
           <a:p>
             <a:pPr lvl="4"/>
@@ -806,6 +817,7 @@
               <a:rPr lang="en-US"/>
               <a:t>Fifth level</a:t>
             </a:r>
+            <a:endParaRPr lang="en-US"/>
           </a:p>
         </p:txBody>
       </p:sp>
@@ -867,7 +879,6 @@
             <a:pPr lvl="0"/>
             <a:fld id="{9A0DB2DC-4C9A-4742-B13C-FB6460FD3503}" type="slidenum">
               <a:rPr lang="zh-CN" altLang="en-US" dirty="0"/>
-              <a:t>‹#›</a:t>
             </a:fld>
             <a:endParaRPr lang="zh-CN" altLang="en-US" dirty="0"/>
           </a:p>
@@ -918,6 +929,7 @@
               <a:rPr lang="en-US"/>
               <a:t>Click to edit Master title style</a:t>
             </a:r>
+            <a:endParaRPr lang="en-US"/>
           </a:p>
         </p:txBody>
       </p:sp>
@@ -941,6 +953,7 @@
               <a:rPr lang="en-US"/>
               <a:t>Click to edit Master text styles</a:t>
             </a:r>
+            <a:endParaRPr lang="en-US"/>
           </a:p>
           <a:p>
             <a:pPr lvl="1"/>
@@ -948,6 +961,7 @@
               <a:rPr lang="en-US"/>
               <a:t>Second level</a:t>
             </a:r>
+            <a:endParaRPr lang="en-US"/>
           </a:p>
           <a:p>
             <a:pPr lvl="2"/>
@@ -955,6 +969,7 @@
               <a:rPr lang="en-US"/>
               <a:t>Third level</a:t>
             </a:r>
+            <a:endParaRPr lang="en-US"/>
           </a:p>
           <a:p>
             <a:pPr lvl="3"/>
@@ -962,6 +977,7 @@
               <a:rPr lang="en-US"/>
               <a:t>Fourth level</a:t>
             </a:r>
+            <a:endParaRPr lang="en-US"/>
           </a:p>
           <a:p>
             <a:pPr lvl="4"/>
@@ -969,6 +985,7 @@
               <a:rPr lang="en-US"/>
               <a:t>Fifth level</a:t>
             </a:r>
+            <a:endParaRPr lang="en-US"/>
           </a:p>
         </p:txBody>
       </p:sp>
@@ -1030,7 +1047,6 @@
             <a:pPr lvl="0"/>
             <a:fld id="{9A0DB2DC-4C9A-4742-B13C-FB6460FD3503}" type="slidenum">
               <a:rPr lang="zh-CN" altLang="en-US" dirty="0"/>
-              <a:t>‹#›</a:t>
             </a:fld>
             <a:endParaRPr lang="zh-CN" altLang="en-US" dirty="0"/>
           </a:p>
@@ -1090,6 +1106,7 @@
               <a:rPr lang="en-US"/>
               <a:t>Click to edit Master title style</a:t>
             </a:r>
+            <a:endParaRPr lang="en-US"/>
           </a:p>
         </p:txBody>
       </p:sp>
@@ -1155,6 +1172,7 @@
               <a:rPr lang="en-US"/>
               <a:t>Click to edit Master text styles</a:t>
             </a:r>
+            <a:endParaRPr lang="en-US"/>
           </a:p>
         </p:txBody>
       </p:sp>
@@ -1216,7 +1234,6 @@
             <a:pPr lvl="0"/>
             <a:fld id="{9A0DB2DC-4C9A-4742-B13C-FB6460FD3503}" type="slidenum">
               <a:rPr lang="zh-CN" altLang="en-US" dirty="0"/>
-              <a:t>‹#›</a:t>
             </a:fld>
             <a:endParaRPr lang="zh-CN" altLang="en-US" dirty="0"/>
           </a:p>
@@ -1267,6 +1284,7 @@
               <a:rPr lang="en-US"/>
               <a:t>Click to edit Master title style</a:t>
             </a:r>
+            <a:endParaRPr lang="en-US"/>
           </a:p>
         </p:txBody>
       </p:sp>
@@ -1295,6 +1313,7 @@
               <a:rPr lang="en-US"/>
               <a:t>Click to edit Master text styles</a:t>
             </a:r>
+            <a:endParaRPr lang="en-US"/>
           </a:p>
           <a:p>
             <a:pPr lvl="1"/>
@@ -1302,6 +1321,7 @@
               <a:rPr lang="en-US"/>
               <a:t>Second level</a:t>
             </a:r>
+            <a:endParaRPr lang="en-US"/>
           </a:p>
           <a:p>
             <a:pPr lvl="2"/>
@@ -1309,6 +1329,7 @@
               <a:rPr lang="en-US"/>
               <a:t>Third level</a:t>
             </a:r>
+            <a:endParaRPr lang="en-US"/>
           </a:p>
           <a:p>
             <a:pPr lvl="3"/>
@@ -1316,6 +1337,7 @@
               <a:rPr lang="en-US"/>
               <a:t>Fourth level</a:t>
             </a:r>
+            <a:endParaRPr lang="en-US"/>
           </a:p>
           <a:p>
             <a:pPr lvl="4"/>
@@ -1323,6 +1345,7 @@
               <a:rPr lang="en-US"/>
               <a:t>Fifth level</a:t>
             </a:r>
+            <a:endParaRPr lang="en-US"/>
           </a:p>
         </p:txBody>
       </p:sp>
@@ -1351,6 +1374,7 @@
               <a:rPr lang="en-US"/>
               <a:t>Click to edit Master text styles</a:t>
             </a:r>
+            <a:endParaRPr lang="en-US"/>
           </a:p>
           <a:p>
             <a:pPr lvl="1"/>
@@ -1358,6 +1382,7 @@
               <a:rPr lang="en-US"/>
               <a:t>Second level</a:t>
             </a:r>
+            <a:endParaRPr lang="en-US"/>
           </a:p>
           <a:p>
             <a:pPr lvl="2"/>
@@ -1365,6 +1390,7 @@
               <a:rPr lang="en-US"/>
               <a:t>Third level</a:t>
             </a:r>
+            <a:endParaRPr lang="en-US"/>
           </a:p>
           <a:p>
             <a:pPr lvl="3"/>
@@ -1372,6 +1398,7 @@
               <a:rPr lang="en-US"/>
               <a:t>Fourth level</a:t>
             </a:r>
+            <a:endParaRPr lang="en-US"/>
           </a:p>
           <a:p>
             <a:pPr lvl="4"/>
@@ -1379,6 +1406,7 @@
               <a:rPr lang="en-US"/>
               <a:t>Fifth level</a:t>
             </a:r>
+            <a:endParaRPr lang="en-US"/>
           </a:p>
         </p:txBody>
       </p:sp>
@@ -1440,7 +1468,6 @@
             <a:pPr lvl="0"/>
             <a:fld id="{9A0DB2DC-4C9A-4742-B13C-FB6460FD3503}" type="slidenum">
               <a:rPr lang="zh-CN" altLang="en-US" dirty="0"/>
-              <a:t>‹#›</a:t>
             </a:fld>
             <a:endParaRPr lang="zh-CN" altLang="en-US" dirty="0"/>
           </a:p>
@@ -1496,6 +1523,7 @@
               <a:rPr lang="en-US"/>
               <a:t>Click to edit Master title style</a:t>
             </a:r>
+            <a:endParaRPr lang="en-US"/>
           </a:p>
         </p:txBody>
       </p:sp>
@@ -1561,6 +1589,7 @@
               <a:rPr lang="en-US"/>
               <a:t>Click to edit Master text styles</a:t>
             </a:r>
+            <a:endParaRPr lang="en-US"/>
           </a:p>
         </p:txBody>
       </p:sp>
@@ -1589,6 +1618,7 @@
               <a:rPr lang="en-US"/>
               <a:t>Click to edit Master text styles</a:t>
             </a:r>
+            <a:endParaRPr lang="en-US"/>
           </a:p>
           <a:p>
             <a:pPr lvl="1"/>
@@ -1596,6 +1626,7 @@
               <a:rPr lang="en-US"/>
               <a:t>Second level</a:t>
             </a:r>
+            <a:endParaRPr lang="en-US"/>
           </a:p>
           <a:p>
             <a:pPr lvl="2"/>
@@ -1603,6 +1634,7 @@
               <a:rPr lang="en-US"/>
               <a:t>Third level</a:t>
             </a:r>
+            <a:endParaRPr lang="en-US"/>
           </a:p>
           <a:p>
             <a:pPr lvl="3"/>
@@ -1610,6 +1642,7 @@
               <a:rPr lang="en-US"/>
               <a:t>Fourth level</a:t>
             </a:r>
+            <a:endParaRPr lang="en-US"/>
           </a:p>
           <a:p>
             <a:pPr lvl="4"/>
@@ -1617,6 +1650,7 @@
               <a:rPr lang="en-US"/>
               <a:t>Fifth level</a:t>
             </a:r>
+            <a:endParaRPr lang="en-US"/>
           </a:p>
         </p:txBody>
       </p:sp>
@@ -1682,6 +1716,7 @@
               <a:rPr lang="en-US"/>
               <a:t>Click to edit Master text styles</a:t>
             </a:r>
+            <a:endParaRPr lang="en-US"/>
           </a:p>
         </p:txBody>
       </p:sp>
@@ -1710,6 +1745,7 @@
               <a:rPr lang="en-US"/>
               <a:t>Click to edit Master text styles</a:t>
             </a:r>
+            <a:endParaRPr lang="en-US"/>
           </a:p>
           <a:p>
             <a:pPr lvl="1"/>
@@ -1717,6 +1753,7 @@
               <a:rPr lang="en-US"/>
               <a:t>Second level</a:t>
             </a:r>
+            <a:endParaRPr lang="en-US"/>
           </a:p>
           <a:p>
             <a:pPr lvl="2"/>
@@ -1724,6 +1761,7 @@
               <a:rPr lang="en-US"/>
               <a:t>Third level</a:t>
             </a:r>
+            <a:endParaRPr lang="en-US"/>
           </a:p>
           <a:p>
             <a:pPr lvl="3"/>
@@ -1731,6 +1769,7 @@
               <a:rPr lang="en-US"/>
               <a:t>Fourth level</a:t>
             </a:r>
+            <a:endParaRPr lang="en-US"/>
           </a:p>
           <a:p>
             <a:pPr lvl="4"/>
@@ -1738,6 +1777,7 @@
               <a:rPr lang="en-US"/>
               <a:t>Fifth level</a:t>
             </a:r>
+            <a:endParaRPr lang="en-US"/>
           </a:p>
         </p:txBody>
       </p:sp>
@@ -1799,7 +1839,6 @@
             <a:pPr lvl="0"/>
             <a:fld id="{9A0DB2DC-4C9A-4742-B13C-FB6460FD3503}" type="slidenum">
               <a:rPr lang="zh-CN" altLang="en-US" dirty="0"/>
-              <a:t>‹#›</a:t>
             </a:fld>
             <a:endParaRPr lang="zh-CN" altLang="en-US" dirty="0"/>
           </a:p>
@@ -1850,6 +1889,7 @@
               <a:rPr lang="en-US"/>
               <a:t>Click to edit Master title style</a:t>
             </a:r>
+            <a:endParaRPr lang="en-US"/>
           </a:p>
         </p:txBody>
       </p:sp>
@@ -1911,7 +1951,6 @@
             <a:pPr lvl="0"/>
             <a:fld id="{9A0DB2DC-4C9A-4742-B13C-FB6460FD3503}" type="slidenum">
               <a:rPr lang="zh-CN" altLang="en-US" dirty="0"/>
-              <a:t>‹#›</a:t>
             </a:fld>
             <a:endParaRPr lang="zh-CN" altLang="en-US" dirty="0"/>
           </a:p>
@@ -2001,7 +2040,6 @@
             <a:pPr lvl="0"/>
             <a:fld id="{9A0DB2DC-4C9A-4742-B13C-FB6460FD3503}" type="slidenum">
               <a:rPr lang="zh-CN" altLang="en-US" dirty="0"/>
-              <a:t>‹#›</a:t>
             </a:fld>
             <a:endParaRPr lang="zh-CN" altLang="en-US" dirty="0"/>
           </a:p>
@@ -2061,6 +2099,7 @@
               <a:rPr lang="en-US"/>
               <a:t>Click to edit Master title style</a:t>
             </a:r>
+            <a:endParaRPr lang="en-US"/>
           </a:p>
         </p:txBody>
       </p:sp>
@@ -2117,6 +2156,7 @@
               <a:rPr lang="en-US"/>
               <a:t>Click to edit Master text styles</a:t>
             </a:r>
+            <a:endParaRPr lang="en-US"/>
           </a:p>
           <a:p>
             <a:pPr lvl="1"/>
@@ -2124,6 +2164,7 @@
               <a:rPr lang="en-US"/>
               <a:t>Second level</a:t>
             </a:r>
+            <a:endParaRPr lang="en-US"/>
           </a:p>
           <a:p>
             <a:pPr lvl="2"/>
@@ -2131,6 +2172,7 @@
               <a:rPr lang="en-US"/>
               <a:t>Third level</a:t>
             </a:r>
+            <a:endParaRPr lang="en-US"/>
           </a:p>
           <a:p>
             <a:pPr lvl="3"/>
@@ -2138,6 +2180,7 @@
               <a:rPr lang="en-US"/>
               <a:t>Fourth level</a:t>
             </a:r>
+            <a:endParaRPr lang="en-US"/>
           </a:p>
           <a:p>
             <a:pPr lvl="4"/>
@@ -2145,6 +2188,7 @@
               <a:rPr lang="en-US"/>
               <a:t>Fifth level</a:t>
             </a:r>
+            <a:endParaRPr lang="en-US"/>
           </a:p>
         </p:txBody>
       </p:sp>
@@ -2210,6 +2254,7 @@
               <a:rPr lang="en-US"/>
               <a:t>Click to edit Master text styles</a:t>
             </a:r>
+            <a:endParaRPr lang="en-US"/>
           </a:p>
         </p:txBody>
       </p:sp>
@@ -2271,7 +2316,6 @@
             <a:pPr lvl="0"/>
             <a:fld id="{9A0DB2DC-4C9A-4742-B13C-FB6460FD3503}" type="slidenum">
               <a:rPr lang="zh-CN" altLang="en-US" dirty="0"/>
-              <a:t>‹#›</a:t>
             </a:fld>
             <a:endParaRPr lang="zh-CN" altLang="en-US" dirty="0"/>
           </a:p>
@@ -2331,6 +2375,7 @@
               <a:rPr lang="en-US"/>
               <a:t>Click to edit Master title style</a:t>
             </a:r>
+            <a:endParaRPr lang="en-US"/>
           </a:p>
         </p:txBody>
       </p:sp>
@@ -2486,6 +2531,7 @@
               <a:rPr lang="en-US"/>
               <a:t>Click to edit Master text styles</a:t>
             </a:r>
+            <a:endParaRPr lang="en-US"/>
           </a:p>
         </p:txBody>
       </p:sp>
@@ -2547,7 +2593,6 @@
             <a:pPr lvl="0"/>
             <a:fld id="{9A0DB2DC-4C9A-4742-B13C-FB6460FD3503}" type="slidenum">
               <a:rPr lang="zh-CN" altLang="en-US" dirty="0"/>
-              <a:t>‹#›</a:t>
             </a:fld>
             <a:endParaRPr lang="zh-CN" altLang="en-US" dirty="0"/>
           </a:p>
@@ -2596,7 +2641,7 @@
           <p:nvPr/>
         </p:nvPicPr>
         <p:blipFill>
-          <a:blip r:embed="rId13"/>
+          <a:blip r:embed="rId12"/>
           <a:stretch>
             <a:fillRect/>
           </a:stretch>
@@ -2647,6 +2692,7 @@
               <a:rPr lang="en-US" altLang="zh-CN" dirty="0"/>
               <a:t>Click to edit Master title style</a:t>
             </a:r>
+            <a:endParaRPr lang="en-US" altLang="zh-CN" dirty="0"/>
           </a:p>
         </p:txBody>
       </p:sp>
@@ -2682,6 +2728,7 @@
               <a:rPr lang="en-US" altLang="zh-CN" dirty="0"/>
               <a:t>Click to edit Master text styles</a:t>
             </a:r>
+            <a:endParaRPr lang="en-US" altLang="zh-CN" dirty="0"/>
           </a:p>
           <a:p>
             <a:pPr lvl="1"/>
@@ -2689,6 +2736,7 @@
               <a:rPr lang="en-US" altLang="zh-CN" dirty="0"/>
               <a:t>Second level</a:t>
             </a:r>
+            <a:endParaRPr lang="en-US" altLang="zh-CN" dirty="0"/>
           </a:p>
           <a:p>
             <a:pPr lvl="2"/>
@@ -2696,6 +2744,7 @@
               <a:rPr lang="en-US" altLang="zh-CN" dirty="0"/>
               <a:t>Third level</a:t>
             </a:r>
+            <a:endParaRPr lang="en-US" altLang="zh-CN" dirty="0"/>
           </a:p>
           <a:p>
             <a:pPr lvl="3"/>
@@ -2703,6 +2752,7 @@
               <a:rPr lang="en-US" altLang="zh-CN" dirty="0"/>
               <a:t>Fourth level</a:t>
             </a:r>
+            <a:endParaRPr lang="en-US" altLang="zh-CN" dirty="0"/>
           </a:p>
           <a:p>
             <a:pPr lvl="4"/>
@@ -2710,6 +2760,7 @@
               <a:rPr lang="en-US" altLang="zh-CN" dirty="0"/>
               <a:t>Fifth level</a:t>
             </a:r>
+            <a:endParaRPr lang="en-US" altLang="zh-CN" dirty="0"/>
           </a:p>
         </p:txBody>
       </p:sp>
@@ -2906,7 +2957,6 @@
             <a:pPr lvl="0"/>
             <a:fld id="{9A0DB2DC-4C9A-4742-B13C-FB6460FD3503}" type="slidenum">
               <a:rPr lang="zh-CN" altLang="en-US" dirty="0"/>
-              <a:t>‹#›</a:t>
             </a:fld>
             <a:endParaRPr lang="zh-CN" altLang="en-US" dirty="0"/>
           </a:p>
@@ -3377,6 +3427,7 @@
               <a:rPr lang="en-US"/>
               <a:t>                </a:t>
             </a:r>
+            <a:endParaRPr lang="en-US"/>
           </a:p>
           <a:p>
             <a:r>
@@ -3385,8 +3436,13 @@
             </a:r>
             <a:r>
               <a:rPr lang="en-US" sz="2000"/>
-              <a:t>22.08.2024</a:t>
-            </a:r>
+              <a:t>14</a:t>
+            </a:r>
+            <a:r>
+              <a:rPr lang="en-US" sz="2000"/>
+              <a:t>.09.2024</a:t>
+            </a:r>
+            <a:endParaRPr lang="en-US" sz="2000"/>
           </a:p>
         </p:txBody>
       </p:sp>
@@ -3428,6 +3484,15 @@
               </a:rPr>
               <a:t>PROIECT FINAL</a:t>
             </a:r>
+            <a:endParaRPr lang="en-US">
+              <a:effectLst>
+                <a:outerShdw blurRad="50800" dist="38100" dir="2700000" algn="tl" rotWithShape="0">
+                  <a:prstClr val="black">
+                    <a:alpha val="40000"/>
+                  </a:prstClr>
+                </a:outerShdw>
+              </a:effectLst>
+            </a:endParaRPr>
           </a:p>
         </p:txBody>
       </p:sp>
@@ -3483,18 +3548,13 @@
               <a:rPr lang="en-US" sz="2800"/>
               <a:t>STORY</a:t>
             </a:r>
+            <a:endParaRPr lang="en-US" sz="2800"/>
           </a:p>
         </p:txBody>
       </p:sp>
       <p:sp>
         <p:nvSpPr>
-          <p:cNvPr id="6" name="Content Placeholder 2">
-            <a:extLst>
-              <a:ext uri="{FF2B5EF4-FFF2-40B4-BE49-F238E27FC236}">
-                <a16:creationId xmlns:a16="http://schemas.microsoft.com/office/drawing/2014/main" id="{EE9AC8DF-24EE-9891-B13E-9483247AB7EE}"/>
-              </a:ext>
-            </a:extLst>
-          </p:cNvPr>
+          <p:cNvPr id="6" name="Content Placeholder 2"/>
           <p:cNvSpPr>
             <a:spLocks noGrp="1"/>
           </p:cNvSpPr>
@@ -3647,25 +3707,20 @@
               <a:rPr lang="en-US" sz="1800" dirty="0"/>
               <a:t>.</a:t>
             </a:r>
+            <a:endParaRPr lang="en-US" sz="1800" dirty="0"/>
           </a:p>
         </p:txBody>
       </p:sp>
       <p:pic>
         <p:nvPicPr>
-          <p:cNvPr id="4" name="Picture 3">
-            <a:extLst>
-              <a:ext uri="{FF2B5EF4-FFF2-40B4-BE49-F238E27FC236}">
-                <a16:creationId xmlns:a16="http://schemas.microsoft.com/office/drawing/2014/main" id="{8B1E980C-DA12-188D-7986-18D615109571}"/>
-              </a:ext>
-            </a:extLst>
-          </p:cNvPr>
+          <p:cNvPr id="4" name="Picture 3"/>
           <p:cNvPicPr>
             <a:picLocks noChangeAspect="1"/>
           </p:cNvPicPr>
           <p:nvPr/>
         </p:nvPicPr>
         <p:blipFill>
-          <a:blip r:embed="rId2"/>
+          <a:blip r:embed="rId1"/>
           <a:stretch>
             <a:fillRect/>
           </a:stretch>
@@ -3681,11 +3736,6 @@
         </p:spPr>
       </p:pic>
     </p:spTree>
-    <p:extLst>
-      <p:ext uri="{BB962C8B-B14F-4D97-AF65-F5344CB8AC3E}">
-        <p14:creationId xmlns:p14="http://schemas.microsoft.com/office/powerpoint/2010/main" val="3842783088"/>
-      </p:ext>
-    </p:extLst>
   </p:cSld>
   <p:clrMapOvr>
     <a:masterClrMapping/>
@@ -3737,18 +3787,13 @@
               <a:rPr lang="en-US" sz="2800"/>
               <a:t>TEST CASES</a:t>
             </a:r>
+            <a:endParaRPr lang="en-US" sz="2800"/>
           </a:p>
         </p:txBody>
       </p:sp>
       <p:sp>
         <p:nvSpPr>
-          <p:cNvPr id="6" name="Content Placeholder 2">
-            <a:extLst>
-              <a:ext uri="{FF2B5EF4-FFF2-40B4-BE49-F238E27FC236}">
-                <a16:creationId xmlns:a16="http://schemas.microsoft.com/office/drawing/2014/main" id="{C861A500-A5CA-96B6-AEFE-67EDCC007D7C}"/>
-              </a:ext>
-            </a:extLst>
-          </p:cNvPr>
+          <p:cNvPr id="6" name="Content Placeholder 2"/>
           <p:cNvSpPr>
             <a:spLocks noGrp="1"/>
           </p:cNvSpPr>
@@ -3989,25 +4034,20 @@
               <a:rPr lang="en-US" sz="1800" dirty="0"/>
               <a:t>.</a:t>
             </a:r>
+            <a:endParaRPr lang="en-US" sz="1800" dirty="0"/>
           </a:p>
         </p:txBody>
       </p:sp>
       <p:pic>
         <p:nvPicPr>
-          <p:cNvPr id="8" name="Picture 7">
-            <a:extLst>
-              <a:ext uri="{FF2B5EF4-FFF2-40B4-BE49-F238E27FC236}">
-                <a16:creationId xmlns:a16="http://schemas.microsoft.com/office/drawing/2014/main" id="{2179515A-CB8A-0E28-C915-84C42F99FAC8}"/>
-              </a:ext>
-            </a:extLst>
-          </p:cNvPr>
+          <p:cNvPr id="8" name="Picture 7"/>
           <p:cNvPicPr>
             <a:picLocks noChangeAspect="1"/>
           </p:cNvPicPr>
           <p:nvPr/>
         </p:nvPicPr>
         <p:blipFill>
-          <a:blip r:embed="rId2"/>
+          <a:blip r:embed="rId1"/>
           <a:stretch>
             <a:fillRect/>
           </a:stretch>
@@ -4074,18 +4114,13 @@
               <a:rPr lang="en-US" sz="2800"/>
               <a:t>TEST CASES</a:t>
             </a:r>
+            <a:endParaRPr lang="en-US" sz="2800"/>
           </a:p>
         </p:txBody>
       </p:sp>
       <p:sp>
         <p:nvSpPr>
-          <p:cNvPr id="6" name="Content Placeholder 2">
-            <a:extLst>
-              <a:ext uri="{FF2B5EF4-FFF2-40B4-BE49-F238E27FC236}">
-                <a16:creationId xmlns:a16="http://schemas.microsoft.com/office/drawing/2014/main" id="{C861A500-A5CA-96B6-AEFE-67EDCC007D7C}"/>
-              </a:ext>
-            </a:extLst>
-          </p:cNvPr>
+          <p:cNvPr id="6" name="Content Placeholder 2"/>
           <p:cNvSpPr>
             <a:spLocks noGrp="1"/>
           </p:cNvSpPr>
@@ -4478,25 +4513,20 @@
               <a:rPr lang="en-US" sz="1800" dirty="0"/>
               <a:t> flow)</a:t>
             </a:r>
+            <a:endParaRPr lang="en-US" sz="1800" dirty="0"/>
           </a:p>
         </p:txBody>
       </p:sp>
       <p:pic>
         <p:nvPicPr>
-          <p:cNvPr id="4" name="Picture 3">
-            <a:extLst>
-              <a:ext uri="{FF2B5EF4-FFF2-40B4-BE49-F238E27FC236}">
-                <a16:creationId xmlns:a16="http://schemas.microsoft.com/office/drawing/2014/main" id="{B0690F7F-6772-63ED-6088-C2E888552A0D}"/>
-              </a:ext>
-            </a:extLst>
-          </p:cNvPr>
+          <p:cNvPr id="4" name="Picture 3"/>
           <p:cNvPicPr>
             <a:picLocks noChangeAspect="1"/>
           </p:cNvPicPr>
           <p:nvPr/>
         </p:nvPicPr>
         <p:blipFill>
-          <a:blip r:embed="rId2"/>
+          <a:blip r:embed="rId1"/>
           <a:stretch>
             <a:fillRect/>
           </a:stretch>
@@ -4513,20 +4543,14 @@
       </p:pic>
       <p:pic>
         <p:nvPicPr>
-          <p:cNvPr id="8" name="Picture 7">
-            <a:extLst>
-              <a:ext uri="{FF2B5EF4-FFF2-40B4-BE49-F238E27FC236}">
-                <a16:creationId xmlns:a16="http://schemas.microsoft.com/office/drawing/2014/main" id="{ABDAD785-11B7-E4FF-E3AC-414B7D3E12BE}"/>
-              </a:ext>
-            </a:extLst>
-          </p:cNvPr>
+          <p:cNvPr id="8" name="Picture 7"/>
           <p:cNvPicPr>
             <a:picLocks noChangeAspect="1"/>
           </p:cNvPicPr>
           <p:nvPr/>
         </p:nvPicPr>
         <p:blipFill>
-          <a:blip r:embed="rId3"/>
+          <a:blip r:embed="rId2"/>
           <a:stretch>
             <a:fillRect/>
           </a:stretch>
@@ -4542,11 +4566,6 @@
         </p:spPr>
       </p:pic>
     </p:spTree>
-    <p:extLst>
-      <p:ext uri="{BB962C8B-B14F-4D97-AF65-F5344CB8AC3E}">
-        <p14:creationId xmlns:p14="http://schemas.microsoft.com/office/powerpoint/2010/main" val="12706298"/>
-      </p:ext>
-    </p:extLst>
   </p:cSld>
   <p:clrMapOvr>
     <a:masterClrMapping/>
@@ -4598,18 +4617,13 @@
               <a:rPr lang="en-US" sz="2800"/>
               <a:t>TEST CASES</a:t>
             </a:r>
+            <a:endParaRPr lang="en-US" sz="2800"/>
           </a:p>
         </p:txBody>
       </p:sp>
       <p:sp>
         <p:nvSpPr>
-          <p:cNvPr id="6" name="Content Placeholder 2">
-            <a:extLst>
-              <a:ext uri="{FF2B5EF4-FFF2-40B4-BE49-F238E27FC236}">
-                <a16:creationId xmlns:a16="http://schemas.microsoft.com/office/drawing/2014/main" id="{C861A500-A5CA-96B6-AEFE-67EDCC007D7C}"/>
-              </a:ext>
-            </a:extLst>
-          </p:cNvPr>
+          <p:cNvPr id="6" name="Content Placeholder 2"/>
           <p:cNvSpPr>
             <a:spLocks noGrp="1"/>
           </p:cNvSpPr>
@@ -5018,25 +5032,20 @@
               <a:rPr lang="en-US" sz="1800" dirty="0"/>
               <a:t>.</a:t>
             </a:r>
+            <a:endParaRPr lang="en-US" sz="1800" dirty="0"/>
           </a:p>
         </p:txBody>
       </p:sp>
       <p:pic>
         <p:nvPicPr>
-          <p:cNvPr id="5" name="Picture 4">
-            <a:extLst>
-              <a:ext uri="{FF2B5EF4-FFF2-40B4-BE49-F238E27FC236}">
-                <a16:creationId xmlns:a16="http://schemas.microsoft.com/office/drawing/2014/main" id="{4701BC77-E976-3A0A-1709-FF515265D841}"/>
-              </a:ext>
-            </a:extLst>
-          </p:cNvPr>
+          <p:cNvPr id="5" name="Picture 4"/>
           <p:cNvPicPr>
             <a:picLocks noChangeAspect="1"/>
           </p:cNvPicPr>
           <p:nvPr/>
         </p:nvPicPr>
         <p:blipFill>
-          <a:blip r:embed="rId2"/>
+          <a:blip r:embed="rId1"/>
           <a:stretch>
             <a:fillRect/>
           </a:stretch>
@@ -5053,20 +5062,14 @@
       </p:pic>
       <p:pic>
         <p:nvPicPr>
-          <p:cNvPr id="9" name="Picture 8">
-            <a:extLst>
-              <a:ext uri="{FF2B5EF4-FFF2-40B4-BE49-F238E27FC236}">
-                <a16:creationId xmlns:a16="http://schemas.microsoft.com/office/drawing/2014/main" id="{C17DAE4D-0051-173E-F430-244965A070FB}"/>
-              </a:ext>
-            </a:extLst>
-          </p:cNvPr>
+          <p:cNvPr id="9" name="Picture 8"/>
           <p:cNvPicPr>
             <a:picLocks noChangeAspect="1"/>
           </p:cNvPicPr>
           <p:nvPr/>
         </p:nvPicPr>
         <p:blipFill>
-          <a:blip r:embed="rId3"/>
+          <a:blip r:embed="rId2"/>
           <a:stretch>
             <a:fillRect/>
           </a:stretch>
@@ -5082,11 +5085,6 @@
         </p:spPr>
       </p:pic>
     </p:spTree>
-    <p:extLst>
-      <p:ext uri="{BB962C8B-B14F-4D97-AF65-F5344CB8AC3E}">
-        <p14:creationId xmlns:p14="http://schemas.microsoft.com/office/powerpoint/2010/main" val="921101088"/>
-      </p:ext>
-    </p:extLst>
   </p:cSld>
   <p:clrMapOvr>
     <a:masterClrMapping/>
@@ -5138,25 +5136,20 @@
               <a:rPr lang="en-US" sz="2800" dirty="0"/>
               <a:t>MATRICEA TRASABILITATII</a:t>
             </a:r>
+            <a:endParaRPr lang="en-US" sz="2800" dirty="0"/>
           </a:p>
         </p:txBody>
       </p:sp>
       <p:pic>
         <p:nvPicPr>
-          <p:cNvPr id="5" name="Picture 4">
-            <a:extLst>
-              <a:ext uri="{FF2B5EF4-FFF2-40B4-BE49-F238E27FC236}">
-                <a16:creationId xmlns:a16="http://schemas.microsoft.com/office/drawing/2014/main" id="{1F5E3B70-4FEC-226C-E1DB-7FD8E94C08C1}"/>
-              </a:ext>
-            </a:extLst>
-          </p:cNvPr>
+          <p:cNvPr id="5" name="Picture 4"/>
           <p:cNvPicPr>
             <a:picLocks noChangeAspect="1"/>
           </p:cNvPicPr>
           <p:nvPr/>
         </p:nvPicPr>
         <p:blipFill>
-          <a:blip r:embed="rId2"/>
+          <a:blip r:embed="rId1"/>
           <a:stretch>
             <a:fillRect/>
           </a:stretch>
@@ -5173,20 +5166,14 @@
       </p:pic>
       <p:pic>
         <p:nvPicPr>
-          <p:cNvPr id="7" name="Picture 6">
-            <a:extLst>
-              <a:ext uri="{FF2B5EF4-FFF2-40B4-BE49-F238E27FC236}">
-                <a16:creationId xmlns:a16="http://schemas.microsoft.com/office/drawing/2014/main" id="{B3E6C716-9043-002D-0C33-A1F0ABAD0FB5}"/>
-              </a:ext>
-            </a:extLst>
-          </p:cNvPr>
+          <p:cNvPr id="7" name="Picture 6"/>
           <p:cNvPicPr>
             <a:picLocks noChangeAspect="1"/>
           </p:cNvPicPr>
           <p:nvPr/>
         </p:nvPicPr>
         <p:blipFill>
-          <a:blip r:embed="rId3"/>
+          <a:blip r:embed="rId2"/>
           <a:stretch>
             <a:fillRect/>
           </a:stretch>
@@ -5203,13 +5190,7 @@
       </p:pic>
       <p:sp>
         <p:nvSpPr>
-          <p:cNvPr id="8" name="Content Placeholder 2">
-            <a:extLst>
-              <a:ext uri="{FF2B5EF4-FFF2-40B4-BE49-F238E27FC236}">
-                <a16:creationId xmlns:a16="http://schemas.microsoft.com/office/drawing/2014/main" id="{57102D5B-0ED3-EE9F-6D5A-7730D5ABCB53}"/>
-              </a:ext>
-            </a:extLst>
-          </p:cNvPr>
+          <p:cNvPr id="8" name="Content Placeholder 2"/>
           <p:cNvSpPr>
             <a:spLocks noGrp="1"/>
           </p:cNvSpPr>
@@ -5318,6 +5299,7 @@
               <a:rPr lang="en-US" sz="1800" dirty="0"/>
               <a:t>:</a:t>
             </a:r>
+            <a:endParaRPr lang="en-US" sz="1800" dirty="0"/>
           </a:p>
           <a:p>
             <a:pPr algn="just"/>
@@ -5333,6 +5315,7 @@
               <a:rPr lang="en-US" sz="1800" dirty="0"/>
               <a:t> (PTNV-2 și PTNV-3)</a:t>
             </a:r>
+            <a:endParaRPr lang="en-US" sz="1800" dirty="0"/>
           </a:p>
           <a:p>
             <a:pPr algn="just"/>
@@ -5340,6 +5323,7 @@
               <a:rPr lang="en-US" sz="1800" dirty="0"/>
               <a:t>11 Test Cases</a:t>
             </a:r>
+            <a:endParaRPr lang="en-US" sz="1800" dirty="0"/>
           </a:p>
           <a:p>
             <a:pPr algn="just"/>
@@ -5347,6 +5331,7 @@
               <a:rPr lang="en-US" sz="1800" dirty="0"/>
               <a:t>1 bug</a:t>
             </a:r>
+            <a:endParaRPr lang="en-US" sz="1800" dirty="0"/>
           </a:p>
         </p:txBody>
       </p:sp>
@@ -5402,25 +5387,20 @@
               <a:rPr lang="en-US" sz="2800"/>
               <a:t>DASHBOARDS</a:t>
             </a:r>
+            <a:endParaRPr lang="en-US" sz="2800"/>
           </a:p>
         </p:txBody>
       </p:sp>
       <p:pic>
         <p:nvPicPr>
-          <p:cNvPr id="5" name="Picture 4">
-            <a:extLst>
-              <a:ext uri="{FF2B5EF4-FFF2-40B4-BE49-F238E27FC236}">
-                <a16:creationId xmlns:a16="http://schemas.microsoft.com/office/drawing/2014/main" id="{6682FF0F-FC77-E7F0-C0BC-969292CDF135}"/>
-              </a:ext>
-            </a:extLst>
-          </p:cNvPr>
+          <p:cNvPr id="5" name="Picture 4"/>
           <p:cNvPicPr>
             <a:picLocks noChangeAspect="1"/>
           </p:cNvPicPr>
           <p:nvPr/>
         </p:nvPicPr>
         <p:blipFill>
-          <a:blip r:embed="rId2"/>
+          <a:blip r:embed="rId1"/>
           <a:stretch>
             <a:fillRect/>
           </a:stretch>
@@ -5437,13 +5417,7 @@
       </p:pic>
       <p:sp>
         <p:nvSpPr>
-          <p:cNvPr id="6" name="Content Placeholder 2">
-            <a:extLst>
-              <a:ext uri="{FF2B5EF4-FFF2-40B4-BE49-F238E27FC236}">
-                <a16:creationId xmlns:a16="http://schemas.microsoft.com/office/drawing/2014/main" id="{8EAD2CFE-8741-D03C-C909-A7A0E5C8744A}"/>
-              </a:ext>
-            </a:extLst>
-          </p:cNvPr>
+          <p:cNvPr id="6" name="Content Placeholder 2"/>
           <p:cNvSpPr>
             <a:spLocks noGrp="1"/>
           </p:cNvSpPr>
@@ -5512,6 +5486,7 @@
               <a:rPr lang="en-US" sz="1800" dirty="0"/>
               <a:t>:</a:t>
             </a:r>
+            <a:endParaRPr lang="en-US" sz="1800" dirty="0"/>
           </a:p>
           <a:p>
             <a:pPr algn="just"/>
@@ -5519,6 +5494,7 @@
               <a:rPr lang="en-US" sz="1800" dirty="0"/>
               <a:t>10 Test Cases sunt cu Passed</a:t>
             </a:r>
+            <a:endParaRPr lang="en-US" sz="1800" dirty="0"/>
           </a:p>
           <a:p>
             <a:pPr algn="just"/>
@@ -5550,6 +5526,7 @@
               <a:rPr lang="en-US" sz="1800" dirty="0"/>
               <a:t> un bug</a:t>
             </a:r>
+            <a:endParaRPr lang="en-US" sz="1800" dirty="0"/>
           </a:p>
         </p:txBody>
       </p:sp>
@@ -5598,18 +5575,13 @@
               <a:rPr lang="en-US" dirty="0"/>
               <a:t>PARTEA II – ASPECTE PRACTICE</a:t>
             </a:r>
+            <a:endParaRPr lang="en-US" dirty="0"/>
           </a:p>
         </p:txBody>
       </p:sp>
       <p:sp>
         <p:nvSpPr>
-          <p:cNvPr id="4" name="Content Placeholder 2">
-            <a:extLst>
-              <a:ext uri="{FF2B5EF4-FFF2-40B4-BE49-F238E27FC236}">
-                <a16:creationId xmlns:a16="http://schemas.microsoft.com/office/drawing/2014/main" id="{CBF571C9-91EF-A9A7-C596-40B695192EAE}"/>
-              </a:ext>
-            </a:extLst>
-          </p:cNvPr>
+          <p:cNvPr id="4" name="Content Placeholder 2"/>
           <p:cNvSpPr>
             <a:spLocks noGrp="1"/>
           </p:cNvSpPr>
@@ -5666,6 +5638,7 @@
               <a:rPr lang="en-US" sz="1800" b="1" dirty="0"/>
               <a:t>: </a:t>
             </a:r>
+            <a:endParaRPr lang="en-US" sz="1800" b="1" dirty="0"/>
           </a:p>
           <a:p>
             <a:pPr algn="just"/>
@@ -6021,6 +5994,7 @@
               <a:rPr lang="en-US" sz="1800" dirty="0"/>
               <a:t>.</a:t>
             </a:r>
+            <a:endParaRPr lang="en-US" sz="1800" dirty="0"/>
           </a:p>
           <a:p>
             <a:pPr algn="just"/>
@@ -6046,6 +6020,7 @@
               <a:rPr lang="en-US" sz="1800" b="1" dirty="0"/>
               <a:t>:</a:t>
             </a:r>
+            <a:endParaRPr lang="en-US" sz="1800" b="1" dirty="0"/>
           </a:p>
           <a:p>
             <a:pPr algn="just"/>
@@ -6145,6 +6120,7 @@
               <a:rPr lang="en-US" sz="1800" dirty="0"/>
               <a:t>)</a:t>
             </a:r>
+            <a:endParaRPr lang="en-US" sz="1800" dirty="0"/>
           </a:p>
           <a:p>
             <a:pPr algn="just"/>
@@ -6228,6 +6204,7 @@
               <a:rPr lang="en-US" sz="1800" dirty="0"/>
               <a:t> </a:t>
             </a:r>
+            <a:endParaRPr lang="en-US" sz="1800" dirty="0"/>
           </a:p>
         </p:txBody>
       </p:sp>
@@ -6276,6 +6253,7 @@
               <a:rPr lang="en-US"/>
               <a:t>PARTEA II – ASPECTE PRACTICE</a:t>
             </a:r>
+            <a:endParaRPr lang="en-US"/>
           </a:p>
         </p:txBody>
       </p:sp>
@@ -6482,6 +6460,7 @@
               <a:rPr lang="en-US" altLang="en-US" sz="1800" dirty="0"/>
               <a:t>.</a:t>
             </a:r>
+            <a:endParaRPr lang="en-US" altLang="en-US" sz="1800" dirty="0"/>
           </a:p>
           <a:p>
             <a:pPr marL="0" indent="0" algn="just">
@@ -6493,20 +6472,14 @@
       </p:sp>
       <p:pic>
         <p:nvPicPr>
-          <p:cNvPr id="5" name="Picture 4">
-            <a:extLst>
-              <a:ext uri="{FF2B5EF4-FFF2-40B4-BE49-F238E27FC236}">
-                <a16:creationId xmlns:a16="http://schemas.microsoft.com/office/drawing/2014/main" id="{C57FFD8F-4F66-3AAA-AE99-A324BDCA7A5B}"/>
-              </a:ext>
-            </a:extLst>
-          </p:cNvPr>
+          <p:cNvPr id="5" name="Picture 4"/>
           <p:cNvPicPr>
             <a:picLocks noChangeAspect="1"/>
           </p:cNvPicPr>
           <p:nvPr/>
         </p:nvPicPr>
         <p:blipFill>
-          <a:blip r:embed="rId2"/>
+          <a:blip r:embed="rId1"/>
           <a:stretch>
             <a:fillRect/>
           </a:stretch>
@@ -6523,20 +6496,14 @@
       </p:pic>
       <p:pic>
         <p:nvPicPr>
-          <p:cNvPr id="7" name="Picture 6">
-            <a:extLst>
-              <a:ext uri="{FF2B5EF4-FFF2-40B4-BE49-F238E27FC236}">
-                <a16:creationId xmlns:a16="http://schemas.microsoft.com/office/drawing/2014/main" id="{A3DCF5B0-8B4C-0C02-D432-B3332B914C98}"/>
-              </a:ext>
-            </a:extLst>
-          </p:cNvPr>
+          <p:cNvPr id="7" name="Picture 6"/>
           <p:cNvPicPr>
             <a:picLocks noChangeAspect="1"/>
           </p:cNvPicPr>
           <p:nvPr/>
         </p:nvPicPr>
         <p:blipFill>
-          <a:blip r:embed="rId3"/>
+          <a:blip r:embed="rId2"/>
           <a:stretch>
             <a:fillRect/>
           </a:stretch>
@@ -6596,6 +6563,7 @@
               <a:rPr lang="en-US"/>
               <a:t>PARTEA II – ASPECTE PRACTICE</a:t>
             </a:r>
+            <a:endParaRPr lang="en-US"/>
           </a:p>
         </p:txBody>
       </p:sp>
@@ -6654,6 +6622,7 @@
               <a:rPr lang="en-US" altLang="en-US" sz="1800" b="1" dirty="0"/>
               <a:t>:</a:t>
             </a:r>
+            <a:endParaRPr lang="en-US" altLang="en-US" sz="1800" b="1" dirty="0"/>
           </a:p>
           <a:p>
             <a:r>
@@ -6738,7 +6707,7 @@
             </a:r>
             <a:r>
               <a:rPr lang="en-US" altLang="en-US" sz="1800" dirty="0">
-                <a:hlinkClick r:id="rId2"/>
+                <a:hlinkClick r:id="rId1"/>
               </a:rPr>
               <a:t>https://www.dedeman.ro</a:t>
             </a:r>
@@ -6906,6 +6875,7 @@
               <a:rPr lang="en-US" altLang="en-US" sz="1800" dirty="0"/>
               <a:t>.</a:t>
             </a:r>
+            <a:endParaRPr lang="en-US" altLang="en-US" sz="1800" dirty="0"/>
           </a:p>
           <a:p>
             <a:r>
@@ -6936,6 +6906,7 @@
               <a:rPr lang="en-US" altLang="en-US" sz="1800" dirty="0"/>
               <a:t>, 11 test cases și un bug ticket.</a:t>
             </a:r>
+            <a:endParaRPr lang="en-US" altLang="en-US" sz="1800" dirty="0"/>
           </a:p>
           <a:p>
             <a:r>
@@ -6974,9 +6945,46 @@
               <a:rPr lang="en-US" altLang="en-US" sz="1800" dirty="0"/>
               <a:t> final.</a:t>
             </a:r>
+            <a:endParaRPr lang="en-US" altLang="en-US" sz="1800" dirty="0"/>
           </a:p>
           <a:p>
             <a:endParaRPr lang="ro-RO" altLang="en-US" sz="1800" dirty="0"/>
+          </a:p>
+        </p:txBody>
+      </p:sp>
+      <p:sp>
+        <p:nvSpPr>
+          <p:cNvPr id="5" name="Text Box 4"/>
+          <p:cNvSpPr txBox="1"/>
+          <p:nvPr/>
+        </p:nvSpPr>
+        <p:spPr>
+          <a:xfrm>
+            <a:off x="784225" y="5420360"/>
+            <a:ext cx="7118350" cy="645160"/>
+          </a:xfrm>
+          <a:prstGeom prst="rect">
+            <a:avLst/>
+          </a:prstGeom>
+          <a:noFill/>
+        </p:spPr>
+        <p:txBody>
+          <a:bodyPr wrap="square" rtlCol="0">
+            <a:spAutoFit/>
+          </a:bodyPr>
+          <a:p>
+            <a:r>
+              <a:rPr lang="en-US"/>
+              <a:t>Proiectul se gaseste la linkul de mai jos:</a:t>
+            </a:r>
+            <a:endParaRPr lang="en-US"/>
+          </a:p>
+          <a:p>
+            <a:r>
+              <a:rPr lang="en-US"/>
+              <a:t>https://github.com/PetreVladimir96/Manual-Testing-Project-in-Jira</a:t>
+            </a:r>
+            <a:endParaRPr lang="en-US"/>
           </a:p>
         </p:txBody>
       </p:sp>
@@ -7073,6 +7081,15 @@
               </a:rPr>
               <a:t>ATENȚIE!</a:t>
             </a:r>
+            <a:endParaRPr lang="en-US" sz="4800">
+              <a:effectLst>
+                <a:innerShdw blurRad="63500" dist="50800" dir="13500000">
+                  <a:prstClr val="black">
+                    <a:alpha val="50000"/>
+                  </a:prstClr>
+                </a:innerShdw>
+              </a:effectLst>
+            </a:endParaRPr>
           </a:p>
         </p:txBody>
       </p:sp>
@@ -7125,6 +7142,7 @@
               <a:rPr lang="en-US"/>
               <a:t>    PARTEA I - ASPECTE TEORETICE</a:t>
             </a:r>
+            <a:endParaRPr lang="en-US"/>
           </a:p>
         </p:txBody>
       </p:sp>
@@ -7164,6 +7182,7 @@
               <a:rPr lang="ro-RO" altLang="en-US" sz="2000" u="sng"/>
               <a:t>ȚELE DE BUSINESS - DEFINIȚIE ȘI UTILIZARE</a:t>
             </a:r>
+            <a:endParaRPr lang="ro-RO" altLang="en-US" sz="2000" u="sng"/>
           </a:p>
           <a:p>
             <a:pPr marL="0" indent="0" algn="ctr">
@@ -7189,6 +7208,7 @@
               <a:rPr lang="ro-RO" altLang="en-US" sz="2000" u="sng"/>
               <a:t>TEST CONDITION ȘI TEST CASE - DIFERENȚE</a:t>
             </a:r>
+            <a:endParaRPr lang="ro-RO" altLang="en-US" sz="2000" u="sng"/>
           </a:p>
           <a:p>
             <a:pPr algn="just">
@@ -7242,6 +7262,7 @@
               <a:rPr lang="ro-RO" altLang="en-US" sz="2000" i="1"/>
               <a:t>cum voi testa?</a:t>
             </a:r>
+            <a:endParaRPr lang="ro-RO" altLang="en-US" sz="2000" i="1"/>
           </a:p>
         </p:txBody>
       </p:sp>
@@ -7329,6 +7350,7 @@
               <a:rPr lang="ro-RO" altLang="en-US" sz="2000"/>
               <a:t>Etapele Procesului de Testare</a:t>
             </a:r>
+            <a:endParaRPr lang="ro-RO" altLang="en-US" sz="2000"/>
           </a:p>
         </p:txBody>
       </p:sp>
@@ -7340,11 +7362,6 @@
             <p:custDataLst>
               <p:tags r:id="rId1"/>
             </p:custDataLst>
-            <p:extLst>
-              <p:ext uri="{D42A27DB-BD31-4B8C-83A1-F6EECF244321}">
-                <p14:modId xmlns:p14="http://schemas.microsoft.com/office/powerpoint/2010/main" val="3410541963"/>
-              </p:ext>
-            </p:extLst>
           </p:nvPr>
         </p:nvGraphicFramePr>
         <p:xfrm>
@@ -7358,55 +7375,13 @@
                 <a:tableStyleId>{5C22544A-7EE6-4342-B048-85BDC9FD1C3A}</a:tableStyleId>
               </a:tblPr>
               <a:tblGrid>
-                <a:gridCol w="1111885">
-                  <a:extLst>
-                    <a:ext uri="{9D8B030D-6E8A-4147-A177-3AD203B41FA5}">
-                      <a16:colId xmlns:a16="http://schemas.microsoft.com/office/drawing/2014/main" val="20000"/>
-                    </a:ext>
-                  </a:extLst>
-                </a:gridCol>
-                <a:gridCol w="1111885">
-                  <a:extLst>
-                    <a:ext uri="{9D8B030D-6E8A-4147-A177-3AD203B41FA5}">
-                      <a16:colId xmlns:a16="http://schemas.microsoft.com/office/drawing/2014/main" val="20001"/>
-                    </a:ext>
-                  </a:extLst>
-                </a:gridCol>
-                <a:gridCol w="914400">
-                  <a:extLst>
-                    <a:ext uri="{9D8B030D-6E8A-4147-A177-3AD203B41FA5}">
-                      <a16:colId xmlns:a16="http://schemas.microsoft.com/office/drawing/2014/main" val="20002"/>
-                    </a:ext>
-                  </a:extLst>
-                </a:gridCol>
-                <a:gridCol w="1309370">
-                  <a:extLst>
-                    <a:ext uri="{9D8B030D-6E8A-4147-A177-3AD203B41FA5}">
-                      <a16:colId xmlns:a16="http://schemas.microsoft.com/office/drawing/2014/main" val="20003"/>
-                    </a:ext>
-                  </a:extLst>
-                </a:gridCol>
-                <a:gridCol w="1111885">
-                  <a:extLst>
-                    <a:ext uri="{9D8B030D-6E8A-4147-A177-3AD203B41FA5}">
-                      <a16:colId xmlns:a16="http://schemas.microsoft.com/office/drawing/2014/main" val="20004"/>
-                    </a:ext>
-                  </a:extLst>
-                </a:gridCol>
-                <a:gridCol w="1111885">
-                  <a:extLst>
-                    <a:ext uri="{9D8B030D-6E8A-4147-A177-3AD203B41FA5}">
-                      <a16:colId xmlns:a16="http://schemas.microsoft.com/office/drawing/2014/main" val="20005"/>
-                    </a:ext>
-                  </a:extLst>
-                </a:gridCol>
-                <a:gridCol w="1111885">
-                  <a:extLst>
-                    <a:ext uri="{9D8B030D-6E8A-4147-A177-3AD203B41FA5}">
-                      <a16:colId xmlns:a16="http://schemas.microsoft.com/office/drawing/2014/main" val="20006"/>
-                    </a:ext>
-                  </a:extLst>
-                </a:gridCol>
+                <a:gridCol w="1111885"/>
+                <a:gridCol w="1111885"/>
+                <a:gridCol w="914400"/>
+                <a:gridCol w="1309370"/>
+                <a:gridCol w="1111885"/>
+                <a:gridCol w="1111885"/>
+                <a:gridCol w="1111885"/>
               </a:tblGrid>
               <a:tr h="600710">
                 <a:tc>
@@ -7421,6 +7396,7 @@
                         <a:rPr lang="ro-RO" altLang="en-US" sz="1100"/>
                         <a:t>Test Planning</a:t>
                       </a:r>
+                      <a:endParaRPr lang="ro-RO" altLang="en-US" sz="1100"/>
                     </a:p>
                   </a:txBody>
                   <a:tcPr/>
@@ -7437,6 +7413,7 @@
                         <a:rPr lang="ro-RO" altLang="en-US" sz="1100"/>
                         <a:t>Test Analysys</a:t>
                       </a:r>
+                      <a:endParaRPr lang="ro-RO" altLang="en-US" sz="1100"/>
                     </a:p>
                   </a:txBody>
                   <a:tcPr/>
@@ -7453,6 +7430,7 @@
                         <a:rPr lang="ro-RO" altLang="en-US" sz="1100"/>
                         <a:t>Test Design</a:t>
                       </a:r>
+                      <a:endParaRPr lang="ro-RO" altLang="en-US" sz="1100"/>
                     </a:p>
                   </a:txBody>
                   <a:tcPr/>
@@ -7469,6 +7447,7 @@
                         <a:rPr lang="ro-RO" altLang="en-US" sz="1100"/>
                         <a:t>Test Implementention</a:t>
                       </a:r>
+                      <a:endParaRPr lang="ro-RO" altLang="en-US" sz="1100"/>
                     </a:p>
                   </a:txBody>
                   <a:tcPr/>
@@ -7485,6 +7464,7 @@
                         <a:rPr lang="ro-RO" altLang="en-US" sz="1100"/>
                         <a:t>Test Execution</a:t>
                       </a:r>
+                      <a:endParaRPr lang="ro-RO" altLang="en-US" sz="1100"/>
                     </a:p>
                   </a:txBody>
                   <a:tcPr/>
@@ -7501,6 +7481,7 @@
                         <a:rPr lang="ro-RO" altLang="en-US" sz="1100"/>
                         <a:t>Test Completion</a:t>
                       </a:r>
+                      <a:endParaRPr lang="ro-RO" altLang="en-US" sz="1100"/>
                     </a:p>
                   </a:txBody>
                   <a:tcPr/>
@@ -7517,15 +7498,11 @@
                         <a:rPr lang="ro-RO" altLang="en-US" sz="1100"/>
                         <a:t>Test Monitoring</a:t>
                       </a:r>
+                      <a:endParaRPr lang="ro-RO" altLang="en-US" sz="1100"/>
                     </a:p>
                   </a:txBody>
                   <a:tcPr/>
                 </a:tc>
-                <a:extLst>
-                  <a:ext uri="{0D108BD9-81ED-4DB2-BD59-A6C34878D82A}">
-                    <a16:rowId xmlns:a16="http://schemas.microsoft.com/office/drawing/2014/main" val="10000"/>
-                  </a:ext>
-                </a:extLst>
               </a:tr>
               <a:tr h="2648585">
                 <a:tc>
@@ -7540,6 +7517,7 @@
                         <a:rPr lang="ro-RO" altLang="en-US" sz="1100"/>
                         <a:t>Reprezintă etapa de stabilire a obiectivelor și a resurselor testării - crearea planului de testare</a:t>
                       </a:r>
+                      <a:endParaRPr lang="ro-RO" altLang="en-US" sz="1100"/>
                     </a:p>
                   </a:txBody>
                   <a:tcPr/>
@@ -7556,6 +7534,7 @@
                         <a:rPr lang="ro-RO" altLang="en-US" sz="1100"/>
                         <a:t>Etapa caracterizată prin identificarea scenariilor de testare și determinarea strategiei și a priorităților</a:t>
                       </a:r>
+                      <a:endParaRPr lang="ro-RO" altLang="en-US" sz="1100"/>
                     </a:p>
                   </a:txBody>
                   <a:tcPr/>
@@ -7572,6 +7551,7 @@
                         <a:rPr lang="ro-RO" altLang="en-US" sz="1100"/>
                         <a:t>Crearea cazurilor de testare și a datelor de testare - planificarea metodelor de testare</a:t>
                       </a:r>
+                      <a:endParaRPr lang="ro-RO" altLang="en-US" sz="1100"/>
                     </a:p>
                   </a:txBody>
                   <a:tcPr/>
@@ -7595,13 +7575,13 @@
                         <a:buSzTx/>
                         <a:buFontTx/>
                         <a:buNone/>
-                        <a:tabLst/>
                         <a:defRPr/>
                       </a:pPr>
                       <a:r>
                         <a:rPr lang="ro-RO" altLang="en-US" sz="1100" dirty="0"/>
                         <a:t>Confingurarea mediului de testare, pregătirea datelor și resurselor pentru a executa testele.</a:t>
                       </a:r>
+                      <a:endParaRPr lang="ro-RO" altLang="en-US" sz="1100" dirty="0"/>
                     </a:p>
                     <a:p>
                       <a:pPr algn="ctr">
@@ -7631,7 +7611,6 @@
                         <a:buSzTx/>
                         <a:buFontTx/>
                         <a:buNone/>
-                        <a:tabLst/>
                         <a:defRPr/>
                       </a:pPr>
                       <a:r>
@@ -7661,6 +7640,7 @@
                         <a:rPr lang="ro-RO" altLang="en-US" sz="1100"/>
                         <a:t>Se caracterizează prin evaluarea rezultatelor obținute, verificarea îndeplinirii obiectivelor și a criteriilor de testare, precum și prin finalizarea documentației și pregătirea raportului final. </a:t>
                       </a:r>
+                      <a:endParaRPr lang="ro-RO" altLang="en-US" sz="1100"/>
                     </a:p>
                   </a:txBody>
                   <a:tcPr/>
@@ -7677,15 +7657,11 @@
                         <a:rPr lang="ro-RO" altLang="en-US" sz="1100" dirty="0"/>
                         <a:t>Etapă care se execută pe întreaga durată a proiectului, avand ca scop compararea progresului real cu planul inițial.</a:t>
                       </a:r>
+                      <a:endParaRPr lang="ro-RO" altLang="en-US" sz="1100" dirty="0"/>
                     </a:p>
                   </a:txBody>
                   <a:tcPr/>
                 </a:tc>
-                <a:extLst>
-                  <a:ext uri="{0D108BD9-81ED-4DB2-BD59-A6C34878D82A}">
-                    <a16:rowId xmlns:a16="http://schemas.microsoft.com/office/drawing/2014/main" val="10001"/>
-                  </a:ext>
-                </a:extLst>
               </a:tr>
             </a:tbl>
           </a:graphicData>
@@ -7744,6 +7720,7 @@
               <a:rPr lang="en-US" sz="1500" i="1" u="sng"/>
               <a:t>Explicați diferența între retesting și regression testing</a:t>
             </a:r>
+            <a:endParaRPr lang="en-US" sz="1500" i="1" u="sng"/>
           </a:p>
           <a:p>
             <a:pPr algn="ctr"/>
@@ -7759,6 +7736,7 @@
               <a:rPr lang="en-US" sz="1500"/>
               <a:t>fost fixate, iar testarea de regresie se face pentru a verifica apariția unor noi defecte apărute după schimbări aduse</a:t>
             </a:r>
+            <a:endParaRPr lang="en-US" sz="1500"/>
           </a:p>
           <a:p>
             <a:pPr algn="ctr"/>
@@ -7766,6 +7744,7 @@
               <a:rPr lang="en-US" sz="1500"/>
               <a:t>aplicației.</a:t>
             </a:r>
+            <a:endParaRPr lang="en-US" sz="1500"/>
           </a:p>
         </p:txBody>
       </p:sp>
@@ -7855,6 +7834,7 @@
               <a:rPr lang="ro-RO" altLang="en-US" sz="1800" i="1" u="sng" dirty="0"/>
               <a:t> </a:t>
             </a:r>
+            <a:endParaRPr lang="ro-RO" altLang="en-US" sz="1800" i="1" u="sng" dirty="0"/>
           </a:p>
           <a:p>
             <a:pPr marL="0" indent="0" algn="ctr">
@@ -8028,6 +8008,7 @@
               <a:rPr lang="ro-RO" altLang="en-US" sz="1800" dirty="0"/>
               <a:t>le;</a:t>
             </a:r>
+            <a:endParaRPr lang="ro-RO" altLang="en-US" sz="1800" dirty="0"/>
           </a:p>
           <a:p>
             <a:endParaRPr lang="en-US" sz="1800" dirty="0"/>
@@ -8044,6 +8025,7 @@
               <a:rPr lang="en-US" sz="1800" i="1" u="sng" dirty="0"/>
               <a:t>BLACKBOX TESTING SI WHITEBOX TESTING</a:t>
             </a:r>
+            <a:endParaRPr lang="en-US" sz="1800" i="1" u="sng" dirty="0"/>
           </a:p>
           <a:p>
             <a:pPr marL="0" indent="0" algn="ctr">
@@ -8243,6 +8225,7 @@
               <a:rPr lang="ro-RO" altLang="en-US" sz="1800" dirty="0"/>
               <a:t>; </a:t>
             </a:r>
+            <a:endParaRPr lang="ro-RO" altLang="en-US" sz="1800" dirty="0"/>
           </a:p>
         </p:txBody>
       </p:sp>
@@ -8324,6 +8307,7 @@
               <a:rPr lang="en-US" sz="1500" b="1" u="sng"/>
               <a:t>Enumerați tehnicile de testare și grupati-le în funcție de categorie (blackbox, whitebox</a:t>
             </a:r>
+            <a:endParaRPr lang="en-US" sz="1500" b="1" u="sng"/>
           </a:p>
           <a:p>
             <a:pPr marL="0" indent="0" algn="ctr">
@@ -8333,6 +8317,7 @@
               <a:rPr lang="en-US" sz="1500" b="1" u="sng"/>
               <a:t>experience-based)</a:t>
             </a:r>
+            <a:endParaRPr lang="en-US" sz="1500" b="1" u="sng"/>
           </a:p>
           <a:p>
             <a:pPr marL="0" indent="0" algn="ctr">
@@ -8357,6 +8342,7 @@
               <a:rPr lang="en-US" sz="1500"/>
               <a:t>Transitioning Testing, Decision Tables.</a:t>
             </a:r>
+            <a:endParaRPr lang="en-US" sz="1500"/>
           </a:p>
           <a:p>
             <a:r>
@@ -8367,6 +8353,7 @@
               <a:rPr lang="en-US" sz="1500"/>
               <a:t>: Statement Coverage, Decision Coverage.</a:t>
             </a:r>
+            <a:endParaRPr lang="en-US" sz="1500"/>
           </a:p>
           <a:p>
             <a:r>
@@ -8377,6 +8364,7 @@
               <a:rPr lang="en-US" sz="1500"/>
               <a:t> Exploratory Testing, Error Guessing, Ad-hoc Testing.</a:t>
             </a:r>
+            <a:endParaRPr lang="en-US" sz="1500"/>
           </a:p>
           <a:p>
             <a:pPr marL="0" indent="0">
@@ -8392,6 +8380,7 @@
               <a:rPr lang="en-US" sz="1500" b="1" i="1"/>
               <a:t>Explicați diferența între verification și validation</a:t>
             </a:r>
+            <a:endParaRPr lang="en-US" sz="1500" b="1" i="1"/>
           </a:p>
           <a:p>
             <a:pPr marL="0" indent="0" algn="ctr">
@@ -8416,6 +8405,7 @@
               <a:rPr lang="en-US" sz="1500"/>
               <a:t>corect și conform cerințelor stabilite în faza de proiectare</a:t>
             </a:r>
+            <a:endParaRPr lang="en-US" sz="1500"/>
           </a:p>
           <a:p>
             <a:r>
@@ -8442,6 +8432,7 @@
               <a:rPr lang="en-US" sz="1500"/>
               <a:t>și utilitate în mediul real.</a:t>
             </a:r>
+            <a:endParaRPr lang="en-US" sz="1500"/>
           </a:p>
         </p:txBody>
       </p:sp>
@@ -8523,6 +8514,7 @@
               <a:rPr lang="en-US" sz="1800" b="1"/>
               <a:t>DIFERENȚA ÎNTRE POSITIVE TESTING ȘI NEGATIVE TESTING</a:t>
             </a:r>
+            <a:endParaRPr lang="en-US" sz="1800" b="1"/>
           </a:p>
           <a:p>
             <a:pPr marL="0" indent="0" algn="ctr">
@@ -8613,6 +8605,7 @@
               <a:rPr lang="en-US" sz="1800" i="1"/>
               <a:t>”, etc.</a:t>
             </a:r>
+            <a:endParaRPr lang="en-US" sz="1800" i="1"/>
           </a:p>
           <a:p>
             <a:r>
@@ -8623,6 +8616,7 @@
               <a:rPr lang="en-US" sz="1800"/>
               <a:t> - este un tip de testare care se concentrează pe validarea</a:t>
             </a:r>
+            <a:endParaRPr lang="en-US" sz="1800"/>
           </a:p>
           <a:p>
             <a:pPr marL="0" indent="457200">
@@ -8694,6 +8688,7 @@
               <a:rPr lang="en-US" sz="1800" i="1"/>
               <a:t>etc.</a:t>
             </a:r>
+            <a:endParaRPr lang="en-US" sz="1800" i="1"/>
           </a:p>
         </p:txBody>
       </p:sp>
@@ -9114,6 +9109,7 @@
               <a:rPr lang="en-US" sz="1800" dirty="0"/>
               <a:t>.</a:t>
             </a:r>
+            <a:endParaRPr lang="en-US" sz="1800" dirty="0"/>
           </a:p>
           <a:p>
             <a:r>
@@ -9339,6 +9335,7 @@
               <a:rPr lang="en-US" sz="1800" dirty="0"/>
               <a:t>.</a:t>
             </a:r>
+            <a:endParaRPr lang="en-US" sz="1800" dirty="0"/>
           </a:p>
         </p:txBody>
       </p:sp>
@@ -9398,13 +9395,7 @@
       </p:sp>
       <p:sp>
         <p:nvSpPr>
-          <p:cNvPr id="6" name="Content Placeholder 2">
-            <a:extLst>
-              <a:ext uri="{FF2B5EF4-FFF2-40B4-BE49-F238E27FC236}">
-                <a16:creationId xmlns:a16="http://schemas.microsoft.com/office/drawing/2014/main" id="{EE9AC8DF-24EE-9891-B13E-9483247AB7EE}"/>
-              </a:ext>
-            </a:extLst>
-          </p:cNvPr>
+          <p:cNvPr id="6" name="Content Placeholder 2"/>
           <p:cNvSpPr>
             <a:spLocks noGrp="1"/>
           </p:cNvSpPr>
@@ -9429,21 +9420,14 @@
               <a:rPr lang="en-US" sz="1800" dirty="0"/>
               <a:t>	</a:t>
             </a:r>
+            <a:endParaRPr lang="en-US" sz="1800" dirty="0"/>
           </a:p>
         </p:txBody>
       </p:sp>
       <p:sp>
         <p:nvSpPr>
-          <p:cNvPr id="7" name="Content Placeholder 2">
-            <a:extLst>
-              <a:ext uri="{FF2B5EF4-FFF2-40B4-BE49-F238E27FC236}">
-                <a16:creationId xmlns:a16="http://schemas.microsoft.com/office/drawing/2014/main" id="{FB02BA69-F513-D618-5ABD-DF7CC67B01DE}"/>
-              </a:ext>
-            </a:extLst>
-          </p:cNvPr>
-          <p:cNvSpPr txBox="1">
-            <a:spLocks/>
-          </p:cNvSpPr>
+          <p:cNvPr id="7" name="Content Placeholder 2"/>
+          <p:cNvSpPr txBox="1"/>
           <p:nvPr/>
         </p:nvSpPr>
         <p:spPr>
@@ -9719,7 +9703,7 @@
             </a:r>
             <a:r>
               <a:rPr lang="en-US" sz="1800" dirty="0">
-                <a:hlinkClick r:id="rId2"/>
+                <a:hlinkClick r:id="rId1"/>
               </a:rPr>
               <a:t>https://www.dedeman.ro/</a:t>
             </a:r>
@@ -9871,6 +9855,7 @@
               <a:rPr lang="en-US" sz="1800" dirty="0"/>
               <a:t> 11 Test Cases.</a:t>
             </a:r>
+            <a:endParaRPr lang="en-US" sz="1800" dirty="0"/>
           </a:p>
           <a:p>
             <a:pPr marL="0" indent="0" algn="just">
@@ -9933,25 +9918,20 @@
               <a:rPr lang="en-US" sz="2800"/>
               <a:t>STORY</a:t>
             </a:r>
+            <a:endParaRPr lang="en-US" sz="2800"/>
           </a:p>
         </p:txBody>
       </p:sp>
       <p:pic>
         <p:nvPicPr>
-          <p:cNvPr id="5" name="Picture 4">
-            <a:extLst>
-              <a:ext uri="{FF2B5EF4-FFF2-40B4-BE49-F238E27FC236}">
-                <a16:creationId xmlns:a16="http://schemas.microsoft.com/office/drawing/2014/main" id="{71DFAFF4-BF5D-5273-2D03-DF3EB670C369}"/>
-              </a:ext>
-            </a:extLst>
-          </p:cNvPr>
+          <p:cNvPr id="5" name="Picture 4"/>
           <p:cNvPicPr>
             <a:picLocks noChangeAspect="1"/>
           </p:cNvPicPr>
           <p:nvPr/>
         </p:nvPicPr>
         <p:blipFill>
-          <a:blip r:embed="rId2"/>
+          <a:blip r:embed="rId1"/>
           <a:stretch>
             <a:fillRect/>
           </a:stretch>
@@ -9968,13 +9948,7 @@
       </p:pic>
       <p:sp>
         <p:nvSpPr>
-          <p:cNvPr id="6" name="Content Placeholder 2">
-            <a:extLst>
-              <a:ext uri="{FF2B5EF4-FFF2-40B4-BE49-F238E27FC236}">
-                <a16:creationId xmlns:a16="http://schemas.microsoft.com/office/drawing/2014/main" id="{EE9AC8DF-24EE-9891-B13E-9483247AB7EE}"/>
-              </a:ext>
-            </a:extLst>
-          </p:cNvPr>
+          <p:cNvPr id="6" name="Content Placeholder 2"/>
           <p:cNvSpPr>
             <a:spLocks noGrp="1"/>
           </p:cNvSpPr>
@@ -10167,15 +10141,11 @@
               <a:rPr lang="en-US" sz="1800" dirty="0"/>
               <a:t> din cart/wish list)</a:t>
             </a:r>
+            <a:endParaRPr lang="en-US" sz="1800" dirty="0"/>
           </a:p>
         </p:txBody>
       </p:sp>
     </p:spTree>
-    <p:extLst>
-      <p:ext uri="{BB962C8B-B14F-4D97-AF65-F5344CB8AC3E}">
-        <p14:creationId xmlns:p14="http://schemas.microsoft.com/office/powerpoint/2010/main" val="1731503736"/>
-      </p:ext>
-    </p:extLst>
   </p:cSld>
   <p:clrMapOvr>
     <a:masterClrMapping/>
@@ -10184,7 +10154,7 @@
 </file>
 
 <file path=ppt/tags/tag1.xml><?xml version="1.0" encoding="utf-8"?>
-<p:tagLst xmlns:a="http://schemas.openxmlformats.org/drawingml/2006/main" xmlns:r="http://schemas.openxmlformats.org/officeDocument/2006/relationships" xmlns:p="http://schemas.openxmlformats.org/presentationml/2006/main">
+<p:tagLst xmlns:p="http://schemas.openxmlformats.org/presentationml/2006/main">
   <p:tag name="TABLE_ENDDRAG_ORIGIN_RECT" val="612*255"/>
   <p:tag name="TABLE_ENDDRAG_RECT" val="59*136*612*255"/>
 </p:tagLst>

</xml_diff>